<commit_message>
feat: 4th order RungeKutta function is created. ODE 45 is replaced with fcn_RungeKutta4Order
</commit_message>
<xml_diff>
--- a/Document/ME452Project_SatyaAndWushuang_Final.pptx
+++ b/Document/ME452Project_SatyaAndWushuang_Final.pptx
@@ -268,7 +268,7 @@
           <a:p>
             <a:fld id="{4B22A9C7-8752-CD42-8AED-F52F5F2DAA80}" type="datetimeFigureOut">
               <a:rPr lang="en-US" smtClean="0"/>
-              <a:t>5/3/2021</a:t>
+              <a:t>5/7/2021</a:t>
             </a:fld>
             <a:endParaRPr lang="en-US"/>
           </a:p>
@@ -466,7 +466,7 @@
           <a:p>
             <a:fld id="{4B22A9C7-8752-CD42-8AED-F52F5F2DAA80}" type="datetimeFigureOut">
               <a:rPr lang="en-US" smtClean="0"/>
-              <a:t>5/3/2021</a:t>
+              <a:t>5/7/2021</a:t>
             </a:fld>
             <a:endParaRPr lang="en-US"/>
           </a:p>
@@ -674,7 +674,7 @@
           <a:p>
             <a:fld id="{4B22A9C7-8752-CD42-8AED-F52F5F2DAA80}" type="datetimeFigureOut">
               <a:rPr lang="en-US" smtClean="0"/>
-              <a:t>5/3/2021</a:t>
+              <a:t>5/7/2021</a:t>
             </a:fld>
             <a:endParaRPr lang="en-US"/>
           </a:p>
@@ -872,7 +872,7 @@
           <a:p>
             <a:fld id="{4B22A9C7-8752-CD42-8AED-F52F5F2DAA80}" type="datetimeFigureOut">
               <a:rPr lang="en-US" smtClean="0"/>
-              <a:t>5/3/2021</a:t>
+              <a:t>5/7/2021</a:t>
             </a:fld>
             <a:endParaRPr lang="en-US"/>
           </a:p>
@@ -1147,7 +1147,7 @@
           <a:p>
             <a:fld id="{4B22A9C7-8752-CD42-8AED-F52F5F2DAA80}" type="datetimeFigureOut">
               <a:rPr lang="en-US" smtClean="0"/>
-              <a:t>5/3/2021</a:t>
+              <a:t>5/7/2021</a:t>
             </a:fld>
             <a:endParaRPr lang="en-US"/>
           </a:p>
@@ -1412,7 +1412,7 @@
           <a:p>
             <a:fld id="{4B22A9C7-8752-CD42-8AED-F52F5F2DAA80}" type="datetimeFigureOut">
               <a:rPr lang="en-US" smtClean="0"/>
-              <a:t>5/3/2021</a:t>
+              <a:t>5/7/2021</a:t>
             </a:fld>
             <a:endParaRPr lang="en-US"/>
           </a:p>
@@ -1824,7 +1824,7 @@
           <a:p>
             <a:fld id="{4B22A9C7-8752-CD42-8AED-F52F5F2DAA80}" type="datetimeFigureOut">
               <a:rPr lang="en-US" smtClean="0"/>
-              <a:t>5/3/2021</a:t>
+              <a:t>5/7/2021</a:t>
             </a:fld>
             <a:endParaRPr lang="en-US"/>
           </a:p>
@@ -1965,7 +1965,7 @@
           <a:p>
             <a:fld id="{4B22A9C7-8752-CD42-8AED-F52F5F2DAA80}" type="datetimeFigureOut">
               <a:rPr lang="en-US" smtClean="0"/>
-              <a:t>5/3/2021</a:t>
+              <a:t>5/7/2021</a:t>
             </a:fld>
             <a:endParaRPr lang="en-US"/>
           </a:p>
@@ -2078,7 +2078,7 @@
           <a:p>
             <a:fld id="{4B22A9C7-8752-CD42-8AED-F52F5F2DAA80}" type="datetimeFigureOut">
               <a:rPr lang="en-US" smtClean="0"/>
-              <a:t>5/3/2021</a:t>
+              <a:t>5/7/2021</a:t>
             </a:fld>
             <a:endParaRPr lang="en-US"/>
           </a:p>
@@ -2389,7 +2389,7 @@
           <a:p>
             <a:fld id="{4B22A9C7-8752-CD42-8AED-F52F5F2DAA80}" type="datetimeFigureOut">
               <a:rPr lang="en-US" smtClean="0"/>
-              <a:t>5/3/2021</a:t>
+              <a:t>5/7/2021</a:t>
             </a:fld>
             <a:endParaRPr lang="en-US"/>
           </a:p>
@@ -2677,7 +2677,7 @@
           <a:p>
             <a:fld id="{4B22A9C7-8752-CD42-8AED-F52F5F2DAA80}" type="datetimeFigureOut">
               <a:rPr lang="en-US" smtClean="0"/>
-              <a:t>5/3/2021</a:t>
+              <a:t>5/7/2021</a:t>
             </a:fld>
             <a:endParaRPr lang="en-US"/>
           </a:p>
@@ -2918,7 +2918,7 @@
           <a:p>
             <a:fld id="{4B22A9C7-8752-CD42-8AED-F52F5F2DAA80}" type="datetimeFigureOut">
               <a:rPr lang="en-US" smtClean="0"/>
-              <a:t>5/3/2021</a:t>
+              <a:t>5/7/2021</a:t>
             </a:fld>
             <a:endParaRPr lang="en-US"/>
           </a:p>
@@ -3582,6 +3582,44 @@
           </a:prstGeom>
         </p:spPr>
       </p:pic>
+      <p:sp>
+        <p:nvSpPr>
+          <p:cNvPr id="6" name="TextBox 5">
+            <a:extLst>
+              <a:ext uri="{FF2B5EF4-FFF2-40B4-BE49-F238E27FC236}">
+                <a16:creationId xmlns:a16="http://schemas.microsoft.com/office/drawing/2014/main" id="{4C2409CC-1541-4FC8-A3E0-7478E4DEC9DA}"/>
+              </a:ext>
+            </a:extLst>
+          </p:cNvPr>
+          <p:cNvSpPr txBox="1"/>
+          <p:nvPr/>
+        </p:nvSpPr>
+        <p:spPr>
+          <a:xfrm>
+            <a:off x="583022" y="6000377"/>
+            <a:ext cx="7831511" cy="369332"/>
+          </a:xfrm>
+          <a:prstGeom prst="rect">
+            <a:avLst/>
+          </a:prstGeom>
+          <a:noFill/>
+        </p:spPr>
+        <p:txBody>
+          <a:bodyPr wrap="square" rtlCol="0">
+            <a:spAutoFit/>
+          </a:bodyPr>
+          <a:lstStyle/>
+          <a:p>
+            <a:r>
+              <a:rPr lang="en-US" dirty="0">
+                <a:hlinkClick r:id="rId5"/>
+              </a:rPr>
+              <a:t>https://github.com/msvsprasad/ME452_BicycleModelProject.git</a:t>
+            </a:r>
+            <a:endParaRPr lang="en-US" dirty="0"/>
+          </a:p>
+        </p:txBody>
+      </p:sp>
     </p:spTree>
     <p:extLst>
       <p:ext uri="{BB962C8B-B14F-4D97-AF65-F5344CB8AC3E}">
@@ -3861,6 +3899,44 @@
           </a:prstGeom>
         </p:spPr>
       </p:pic>
+      <p:sp>
+        <p:nvSpPr>
+          <p:cNvPr id="3" name="TextBox 2">
+            <a:extLst>
+              <a:ext uri="{FF2B5EF4-FFF2-40B4-BE49-F238E27FC236}">
+                <a16:creationId xmlns:a16="http://schemas.microsoft.com/office/drawing/2014/main" id="{2DF9EED0-680F-43D6-93F7-2B835237B21B}"/>
+              </a:ext>
+            </a:extLst>
+          </p:cNvPr>
+          <p:cNvSpPr txBox="1"/>
+          <p:nvPr/>
+        </p:nvSpPr>
+        <p:spPr>
+          <a:xfrm>
+            <a:off x="213153" y="6000377"/>
+            <a:ext cx="7831511" cy="369332"/>
+          </a:xfrm>
+          <a:prstGeom prst="rect">
+            <a:avLst/>
+          </a:prstGeom>
+          <a:noFill/>
+        </p:spPr>
+        <p:txBody>
+          <a:bodyPr wrap="square" rtlCol="0">
+            <a:spAutoFit/>
+          </a:bodyPr>
+          <a:lstStyle/>
+          <a:p>
+            <a:r>
+              <a:rPr lang="en-US" dirty="0">
+                <a:hlinkClick r:id="rId3"/>
+              </a:rPr>
+              <a:t>https://github.com/msvsprasad/ME452_BicycleModelProject.git</a:t>
+            </a:r>
+            <a:endParaRPr lang="en-US" dirty="0"/>
+          </a:p>
+        </p:txBody>
+      </p:sp>
     </p:spTree>
     <p:extLst>
       <p:ext uri="{BB962C8B-B14F-4D97-AF65-F5344CB8AC3E}">

</xml_diff>